<commit_message>
Update presentation for nullcon
</commit_message>
<xml_diff>
--- a/4.0/presentations/NullCon 2019 ASVS 4.0 Release.pptx
+++ b/4.0/presentations/NullCon 2019 ASVS 4.0 Release.pptx
@@ -21,19 +21,24 @@
     <p:sldId id="282" r:id="rId15"/>
     <p:sldId id="266" r:id="rId16"/>
     <p:sldId id="261" r:id="rId17"/>
-    <p:sldId id="268" r:id="rId18"/>
-    <p:sldId id="269" r:id="rId19"/>
-    <p:sldId id="270" r:id="rId20"/>
-    <p:sldId id="271" r:id="rId21"/>
-    <p:sldId id="272" r:id="rId22"/>
-    <p:sldId id="273" r:id="rId23"/>
-    <p:sldId id="274" r:id="rId24"/>
-    <p:sldId id="283" r:id="rId25"/>
-    <p:sldId id="279" r:id="rId26"/>
-    <p:sldId id="276" r:id="rId27"/>
-    <p:sldId id="275" r:id="rId28"/>
-    <p:sldId id="285" r:id="rId29"/>
-    <p:sldId id="277" r:id="rId30"/>
+    <p:sldId id="287" r:id="rId18"/>
+    <p:sldId id="288" r:id="rId19"/>
+    <p:sldId id="268" r:id="rId20"/>
+    <p:sldId id="289" r:id="rId21"/>
+    <p:sldId id="290" r:id="rId22"/>
+    <p:sldId id="291" r:id="rId23"/>
+    <p:sldId id="269" r:id="rId24"/>
+    <p:sldId id="270" r:id="rId25"/>
+    <p:sldId id="271" r:id="rId26"/>
+    <p:sldId id="272" r:id="rId27"/>
+    <p:sldId id="273" r:id="rId28"/>
+    <p:sldId id="274" r:id="rId29"/>
+    <p:sldId id="283" r:id="rId30"/>
+    <p:sldId id="276" r:id="rId31"/>
+    <p:sldId id="275" r:id="rId32"/>
+    <p:sldId id="285" r:id="rId33"/>
+    <p:sldId id="279" r:id="rId34"/>
+    <p:sldId id="277" r:id="rId35"/>
   </p:sldIdLst>
   <p:sldSz cx="12192000" cy="6858000"/>
   <p:notesSz cx="6858000" cy="9144000"/>
@@ -1057,7 +1062,7 @@
           <a:p>
             <a:fld id="{B0DC2BCB-5992-4842-BC12-89CD5AE6C805}" type="datetimeFigureOut">
               <a:rPr lang="en-US" smtClean="0"/>
-              <a:t>2/27/19</a:t>
+              <a:t>3/1/19</a:t>
             </a:fld>
             <a:endParaRPr lang="en-US"/>
           </a:p>
@@ -1255,7 +1260,7 @@
           <a:p>
             <a:fld id="{B0DC2BCB-5992-4842-BC12-89CD5AE6C805}" type="datetimeFigureOut">
               <a:rPr lang="en-US" smtClean="0"/>
-              <a:t>2/27/19</a:t>
+              <a:t>3/1/19</a:t>
             </a:fld>
             <a:endParaRPr lang="en-US"/>
           </a:p>
@@ -1463,7 +1468,7 @@
           <a:p>
             <a:fld id="{B0DC2BCB-5992-4842-BC12-89CD5AE6C805}" type="datetimeFigureOut">
               <a:rPr lang="en-US" smtClean="0"/>
-              <a:t>2/27/19</a:t>
+              <a:t>3/1/19</a:t>
             </a:fld>
             <a:endParaRPr lang="en-US"/>
           </a:p>
@@ -1661,7 +1666,7 @@
           <a:p>
             <a:fld id="{B0DC2BCB-5992-4842-BC12-89CD5AE6C805}" type="datetimeFigureOut">
               <a:rPr lang="en-US" smtClean="0"/>
-              <a:t>2/27/19</a:t>
+              <a:t>3/1/19</a:t>
             </a:fld>
             <a:endParaRPr lang="en-US"/>
           </a:p>
@@ -1936,7 +1941,7 @@
           <a:p>
             <a:fld id="{B0DC2BCB-5992-4842-BC12-89CD5AE6C805}" type="datetimeFigureOut">
               <a:rPr lang="en-US" smtClean="0"/>
-              <a:t>2/27/19</a:t>
+              <a:t>3/1/19</a:t>
             </a:fld>
             <a:endParaRPr lang="en-US"/>
           </a:p>
@@ -2201,7 +2206,7 @@
           <a:p>
             <a:fld id="{B0DC2BCB-5992-4842-BC12-89CD5AE6C805}" type="datetimeFigureOut">
               <a:rPr lang="en-US" smtClean="0"/>
-              <a:t>2/27/19</a:t>
+              <a:t>3/1/19</a:t>
             </a:fld>
             <a:endParaRPr lang="en-US"/>
           </a:p>
@@ -2613,7 +2618,7 @@
           <a:p>
             <a:fld id="{B0DC2BCB-5992-4842-BC12-89CD5AE6C805}" type="datetimeFigureOut">
               <a:rPr lang="en-US" smtClean="0"/>
-              <a:t>2/27/19</a:t>
+              <a:t>3/1/19</a:t>
             </a:fld>
             <a:endParaRPr lang="en-US"/>
           </a:p>
@@ -2754,7 +2759,7 @@
           <a:p>
             <a:fld id="{B0DC2BCB-5992-4842-BC12-89CD5AE6C805}" type="datetimeFigureOut">
               <a:rPr lang="en-US" smtClean="0"/>
-              <a:t>2/27/19</a:t>
+              <a:t>3/1/19</a:t>
             </a:fld>
             <a:endParaRPr lang="en-US"/>
           </a:p>
@@ -2867,7 +2872,7 @@
           <a:p>
             <a:fld id="{B0DC2BCB-5992-4842-BC12-89CD5AE6C805}" type="datetimeFigureOut">
               <a:rPr lang="en-US" smtClean="0"/>
-              <a:t>2/27/19</a:t>
+              <a:t>3/1/19</a:t>
             </a:fld>
             <a:endParaRPr lang="en-US"/>
           </a:p>
@@ -3178,7 +3183,7 @@
           <a:p>
             <a:fld id="{B0DC2BCB-5992-4842-BC12-89CD5AE6C805}" type="datetimeFigureOut">
               <a:rPr lang="en-US" smtClean="0"/>
-              <a:t>2/27/19</a:t>
+              <a:t>3/1/19</a:t>
             </a:fld>
             <a:endParaRPr lang="en-US"/>
           </a:p>
@@ -3469,7 +3474,7 @@
           <a:p>
             <a:fld id="{B0DC2BCB-5992-4842-BC12-89CD5AE6C805}" type="datetimeFigureOut">
               <a:rPr lang="en-US" smtClean="0"/>
-              <a:t>2/27/19</a:t>
+              <a:t>3/1/19</a:t>
             </a:fld>
             <a:endParaRPr lang="en-US"/>
           </a:p>
@@ -3719,7 +3724,7 @@
           <a:p>
             <a:fld id="{B0DC2BCB-5992-4842-BC12-89CD5AE6C805}" type="datetimeFigureOut">
               <a:rPr lang="en-US" smtClean="0"/>
-              <a:t>2/27/19</a:t>
+              <a:t>3/1/19</a:t>
             </a:fld>
             <a:endParaRPr lang="en-US"/>
           </a:p>
@@ -4772,7 +4777,7 @@
           <a:p>
             <a:r>
               <a:rPr lang="en-US" dirty="0"/>
-              <a:t>Architecture</a:t>
+              <a:t>V1 Architecture</a:t>
             </a:r>
           </a:p>
         </p:txBody>
@@ -4795,12 +4800,14 @@
         </p:nvSpPr>
         <p:spPr/>
         <p:txBody>
-          <a:bodyPr/>
-          <a:lstStyle/>
-          <a:p>
-            <a:r>
-              <a:rPr lang="en-US" dirty="0"/>
-              <a:t>Completely new</a:t>
+          <a:bodyPr>
+            <a:normAutofit lnSpcReduction="10000"/>
+          </a:bodyPr>
+          <a:lstStyle/>
+          <a:p>
+            <a:r>
+              <a:rPr lang="en-US" dirty="0"/>
+              <a:t>Completely revamped</a:t>
             </a:r>
           </a:p>
           <a:p>
@@ -4815,6 +4822,18 @@
           <a:p>
             <a:r>
               <a:rPr lang="en-US" dirty="0"/>
+              <a:t>Requires Secure Software Development Lifecycle</a:t>
+            </a:r>
+          </a:p>
+          <a:p>
+            <a:r>
+              <a:rPr lang="en-US" dirty="0"/>
+              <a:t>Requires threat modeling </a:t>
+            </a:r>
+          </a:p>
+          <a:p>
+            <a:r>
+              <a:rPr lang="en-US" dirty="0"/>
               <a:t>Design and build security in!</a:t>
             </a:r>
           </a:p>
@@ -4824,7 +4843,7 @@
           <a:p>
             <a:r>
               <a:rPr lang="en-US" dirty="0"/>
-              <a:t>Level 2 and 3 only</a:t>
+              <a:t>Levels 2 and 3 only</a:t>
             </a:r>
           </a:p>
         </p:txBody>
@@ -4882,7 +4901,7 @@
           <a:p>
             <a:r>
               <a:rPr lang="en-US" dirty="0"/>
-              <a:t>Authentication and NIST 800-63</a:t>
+              <a:t>V2 Authentication</a:t>
             </a:r>
           </a:p>
         </p:txBody>
@@ -4937,41 +4956,26 @@
           <a:p>
             <a:r>
               <a:rPr lang="en-US" dirty="0"/>
-              <a:t>Multi-factor is now expected, crypto devices, web services</a:t>
-            </a:r>
-          </a:p>
-          <a:p>
-            <a:r>
-              <a:rPr lang="en-US" dirty="0"/>
-              <a:t>JWT, </a:t>
-            </a:r>
-            <a:r>
-              <a:rPr lang="en-US" dirty="0" err="1"/>
-              <a:t>Oauth</a:t>
-            </a:r>
-            <a:r>
-              <a:rPr lang="en-US" dirty="0"/>
-              <a:t>, federated security</a:t>
-            </a:r>
-          </a:p>
-          <a:p>
-            <a:r>
-              <a:rPr lang="en-US" dirty="0"/>
-              <a:t>Advanced session management attacks</a:t>
-            </a:r>
-          </a:p>
-          <a:p>
-            <a:pPr lvl="1"/>
-            <a:r>
-              <a:rPr lang="en-US" dirty="0"/>
-              <a:t>Half open attack</a:t>
-            </a:r>
-          </a:p>
-          <a:p>
-            <a:pPr marL="0" indent="0">
-              <a:buNone/>
-            </a:pPr>
-            <a:endParaRPr lang="en-US" dirty="0"/>
+              <a:t>Credential recovery</a:t>
+            </a:r>
+          </a:p>
+          <a:p>
+            <a:r>
+              <a:rPr lang="en-US" dirty="0"/>
+              <a:t>Credential storage requirements</a:t>
+            </a:r>
+          </a:p>
+          <a:p>
+            <a:r>
+              <a:rPr lang="en-US" dirty="0"/>
+              <a:t>Multi-factor now covers soft tokens through crypto signing calculators</a:t>
+            </a:r>
+          </a:p>
+          <a:p>
+            <a:r>
+              <a:rPr lang="en-US" dirty="0"/>
+              <a:t>FIDO support</a:t>
+            </a:r>
           </a:p>
         </p:txBody>
       </p:sp>
@@ -5010,7 +5014,7 @@
           <p:cNvPr id="2" name="Title 1">
             <a:extLst>
               <a:ext uri="{FF2B5EF4-FFF2-40B4-BE49-F238E27FC236}">
-                <a16:creationId xmlns:a16="http://schemas.microsoft.com/office/drawing/2014/main" id="{AA433EB3-1E09-4E18-BB63-825003E6430E}"/>
+                <a16:creationId xmlns:a16="http://schemas.microsoft.com/office/drawing/2014/main" id="{A94A906C-F90F-A14D-86A1-4C856A24338C}"/>
               </a:ext>
             </a:extLst>
           </p:cNvPr>
@@ -5028,7 +5032,7 @@
           <a:p>
             <a:r>
               <a:rPr lang="en-US" dirty="0"/>
-              <a:t>Validation, Sanitization, and Encoding</a:t>
+              <a:t>V3 Session Management</a:t>
             </a:r>
           </a:p>
         </p:txBody>
@@ -5038,7 +5042,7 @@
           <p:cNvPr id="3" name="Content Placeholder 2">
             <a:extLst>
               <a:ext uri="{FF2B5EF4-FFF2-40B4-BE49-F238E27FC236}">
-                <a16:creationId xmlns:a16="http://schemas.microsoft.com/office/drawing/2014/main" id="{76CEA67C-EECC-4439-80A2-2D13188C80C4}"/>
+                <a16:creationId xmlns:a16="http://schemas.microsoft.com/office/drawing/2014/main" id="{6F3523C4-D42C-3545-B0B4-E9E50ECAF8C5}"/>
               </a:ext>
             </a:extLst>
           </p:cNvPr>
@@ -5056,55 +5060,25 @@
           <a:p>
             <a:r>
               <a:rPr lang="en-US" dirty="0"/>
-              <a:t>Major revamp</a:t>
-            </a:r>
-          </a:p>
-          <a:p>
-            <a:r>
-              <a:rPr lang="en-US" dirty="0"/>
-              <a:t>Divided into easy to consume sections </a:t>
-            </a:r>
-          </a:p>
-          <a:p>
-            <a:pPr lvl="1"/>
-            <a:r>
-              <a:rPr lang="en-US" dirty="0"/>
-              <a:t>Standardized Input and Output Pipelines</a:t>
-            </a:r>
-          </a:p>
-          <a:p>
-            <a:pPr lvl="1"/>
-            <a:r>
-              <a:rPr lang="en-US" dirty="0"/>
-              <a:t>Input validation for modern applications and APIs</a:t>
-            </a:r>
-          </a:p>
-          <a:p>
-            <a:pPr lvl="1"/>
-            <a:r>
-              <a:rPr lang="en-US" dirty="0"/>
-              <a:t>Output encoding is the new hotness</a:t>
-            </a:r>
-          </a:p>
-          <a:p>
-            <a:pPr lvl="1"/>
-            <a:r>
-              <a:rPr lang="en-US" dirty="0"/>
-              <a:t>Injection prevention (including XXE and XML attacks)</a:t>
-            </a:r>
-          </a:p>
-          <a:p>
-            <a:pPr lvl="1"/>
-            <a:r>
-              <a:rPr lang="en-US" dirty="0"/>
-              <a:t>SSRF</a:t>
-            </a:r>
-          </a:p>
-          <a:p>
-            <a:pPr lvl="1"/>
-            <a:r>
-              <a:rPr lang="en-US" dirty="0"/>
-              <a:t>Deserialization</a:t>
+              <a:t>Deals with APIs, JWT, token, API, and cookie based session management</a:t>
+            </a:r>
+          </a:p>
+          <a:p>
+            <a:r>
+              <a:rPr lang="en-US" dirty="0"/>
+              <a:t>Longer timeouts for many apps for refresh tokens</a:t>
+            </a:r>
+          </a:p>
+          <a:p>
+            <a:r>
+              <a:rPr lang="en-US" dirty="0"/>
+              <a:t>Federated session management including full logout</a:t>
+            </a:r>
+          </a:p>
+          <a:p>
+            <a:r>
+              <a:rPr lang="en-US" dirty="0"/>
+              <a:t>Half open attack!</a:t>
             </a:r>
           </a:p>
         </p:txBody>
@@ -5112,7 +5086,7 @@
     </p:spTree>
     <p:extLst>
       <p:ext uri="{BB962C8B-B14F-4D97-AF65-F5344CB8AC3E}">
-        <p14:creationId xmlns:p14="http://schemas.microsoft.com/office/powerpoint/2010/main" val="426741179"/>
+        <p14:creationId xmlns:p14="http://schemas.microsoft.com/office/powerpoint/2010/main" val="3616956837"/>
       </p:ext>
     </p:extLst>
   </p:cSld>
@@ -5144,7 +5118,7 @@
           <p:cNvPr id="2" name="Title 1">
             <a:extLst>
               <a:ext uri="{FF2B5EF4-FFF2-40B4-BE49-F238E27FC236}">
-                <a16:creationId xmlns:a16="http://schemas.microsoft.com/office/drawing/2014/main" id="{3B9FE9B9-5241-4843-B2B4-F5E75738EBC8}"/>
+                <a16:creationId xmlns:a16="http://schemas.microsoft.com/office/drawing/2014/main" id="{D1109A44-FDB3-4B40-B416-7763A824503D}"/>
               </a:ext>
             </a:extLst>
           </p:cNvPr>
@@ -5162,7 +5136,7 @@
           <a:p>
             <a:r>
               <a:rPr lang="en-US" dirty="0"/>
-              <a:t>Communications Security</a:t>
+              <a:t>V4 Access Control</a:t>
             </a:r>
           </a:p>
         </p:txBody>
@@ -5172,7 +5146,7 @@
           <p:cNvPr id="3" name="Content Placeholder 2">
             <a:extLst>
               <a:ext uri="{FF2B5EF4-FFF2-40B4-BE49-F238E27FC236}">
-                <a16:creationId xmlns:a16="http://schemas.microsoft.com/office/drawing/2014/main" id="{73EB383F-1209-4CCF-B1D1-C993D4A6E98F}"/>
+                <a16:creationId xmlns:a16="http://schemas.microsoft.com/office/drawing/2014/main" id="{63DD0195-2DE8-CF48-94B9-16A7373FEF5C}"/>
               </a:ext>
             </a:extLst>
           </p:cNvPr>
@@ -5190,50 +5164,13 @@
           <a:p>
             <a:r>
               <a:rPr lang="en-US" dirty="0"/>
-              <a:t>Now </a:t>
-            </a:r>
-            <a:r>
-              <a:rPr lang="en-US" dirty="0" err="1"/>
-              <a:t>DevSecOps</a:t>
-            </a:r>
-            <a:r>
-              <a:rPr lang="en-US" dirty="0"/>
-              <a:t> friendly</a:t>
-            </a:r>
-          </a:p>
-          <a:p>
-            <a:pPr lvl="1"/>
-            <a:r>
-              <a:rPr lang="en-US" dirty="0"/>
-              <a:t>No more building a secure chain / path … what does that even mean?</a:t>
-            </a:r>
-          </a:p>
-          <a:p>
-            <a:pPr lvl="1"/>
-            <a:endParaRPr lang="en-US" dirty="0"/>
-          </a:p>
-          <a:p>
-            <a:r>
-              <a:rPr lang="en-US" dirty="0"/>
-              <a:t>Easier to comply … automatically</a:t>
-            </a:r>
-          </a:p>
-          <a:p>
-            <a:r>
-              <a:rPr lang="en-US" dirty="0"/>
-              <a:t>TLS all the things</a:t>
-            </a:r>
-          </a:p>
-          <a:p>
-            <a:r>
-              <a:rPr lang="en-US" dirty="0"/>
-              <a:t>Use modern configuration builders</a:t>
-            </a:r>
-          </a:p>
-          <a:p>
-            <a:r>
-              <a:rPr lang="en-US" dirty="0"/>
-              <a:t>Use the verification tools you use today</a:t>
+              <a:t>Covers API access control security </a:t>
+            </a:r>
+          </a:p>
+          <a:p>
+            <a:r>
+              <a:rPr lang="en-US" dirty="0"/>
+              <a:t>Covers serverless and cloud access control (”server-side” is gone)</a:t>
             </a:r>
           </a:p>
           <a:p>
@@ -5244,7 +5181,7 @@
     </p:spTree>
     <p:extLst>
       <p:ext uri="{BB962C8B-B14F-4D97-AF65-F5344CB8AC3E}">
-        <p14:creationId xmlns:p14="http://schemas.microsoft.com/office/powerpoint/2010/main" val="3078731923"/>
+        <p14:creationId xmlns:p14="http://schemas.microsoft.com/office/powerpoint/2010/main" val="432774233"/>
       </p:ext>
     </p:extLst>
   </p:cSld>
@@ -5276,7 +5213,7 @@
           <p:cNvPr id="2" name="Title 1">
             <a:extLst>
               <a:ext uri="{FF2B5EF4-FFF2-40B4-BE49-F238E27FC236}">
-                <a16:creationId xmlns:a16="http://schemas.microsoft.com/office/drawing/2014/main" id="{70960941-4527-43AA-8F91-9932601B3E06}"/>
+                <a16:creationId xmlns:a16="http://schemas.microsoft.com/office/drawing/2014/main" id="{AA433EB3-1E09-4E18-BB63-825003E6430E}"/>
               </a:ext>
             </a:extLst>
           </p:cNvPr>
@@ -5294,7 +5231,7 @@
           <a:p>
             <a:r>
               <a:rPr lang="en-US" dirty="0"/>
-              <a:t>Malicious Code</a:t>
+              <a:t>V5 Validation, Sanitization, and Encoding</a:t>
             </a:r>
           </a:p>
         </p:txBody>
@@ -5304,7 +5241,7 @@
           <p:cNvPr id="3" name="Content Placeholder 2">
             <a:extLst>
               <a:ext uri="{FF2B5EF4-FFF2-40B4-BE49-F238E27FC236}">
-                <a16:creationId xmlns:a16="http://schemas.microsoft.com/office/drawing/2014/main" id="{50573F35-2C9D-43C1-AEB2-A77410643D05}"/>
+                <a16:creationId xmlns:a16="http://schemas.microsoft.com/office/drawing/2014/main" id="{76CEA67C-EECC-4439-80A2-2D13188C80C4}"/>
               </a:ext>
             </a:extLst>
           </p:cNvPr>
@@ -5322,51 +5259,55 @@
           <a:p>
             <a:r>
               <a:rPr lang="en-US" dirty="0"/>
-              <a:t>Major update to this section to cover more than just time bombs and Easter eggs</a:t>
+              <a:t>Major revamp</a:t>
+            </a:r>
+          </a:p>
+          <a:p>
+            <a:r>
+              <a:rPr lang="en-US" dirty="0"/>
+              <a:t>Divided into easy to consume sections </a:t>
             </a:r>
           </a:p>
           <a:p>
             <a:pPr lvl="1"/>
             <a:r>
               <a:rPr lang="en-US" dirty="0"/>
-              <a:t>Detect malicious code introduction </a:t>
+              <a:t>Standardized Input and Output Pipelines</a:t>
             </a:r>
           </a:p>
           <a:p>
             <a:pPr lvl="1"/>
             <a:r>
               <a:rPr lang="en-US" dirty="0"/>
-              <a:t>Continuous detection through building</a:t>
+              <a:t>Input validation for modern applications and APIs</a:t>
             </a:r>
           </a:p>
           <a:p>
             <a:pPr lvl="1"/>
             <a:r>
               <a:rPr lang="en-US" dirty="0"/>
-              <a:t>Privacy invading libraries (Google’s PUA) mentioned for first time</a:t>
+              <a:t>Output encoding is the new hotness</a:t>
             </a:r>
           </a:p>
           <a:p>
             <a:pPr lvl="1"/>
             <a:r>
               <a:rPr lang="en-US" dirty="0"/>
-              <a:t>Malicious business logic, such as salami attacks</a:t>
+              <a:t>Injection prevention (including XXE and XML attacks)</a:t>
             </a:r>
           </a:p>
           <a:p>
             <a:pPr lvl="1"/>
             <a:r>
               <a:rPr lang="en-US" dirty="0"/>
-              <a:t>Privacy invading permissions (camera, location, microphone, contacts, etc)</a:t>
-            </a:r>
-          </a:p>
-          <a:p>
-            <a:endParaRPr lang="en-US" dirty="0"/>
-          </a:p>
-          <a:p>
-            <a:r>
-              <a:rPr lang="en-US" dirty="0"/>
-              <a:t>Mostly Level 3 for apps that can kill you or run the world economy</a:t>
+              <a:t>SSRF</a:t>
+            </a:r>
+          </a:p>
+          <a:p>
+            <a:pPr lvl="1"/>
+            <a:r>
+              <a:rPr lang="en-US" dirty="0"/>
+              <a:t>Deserialization</a:t>
             </a:r>
           </a:p>
         </p:txBody>
@@ -5374,7 +5315,7 @@
     </p:spTree>
     <p:extLst>
       <p:ext uri="{BB962C8B-B14F-4D97-AF65-F5344CB8AC3E}">
-        <p14:creationId xmlns:p14="http://schemas.microsoft.com/office/powerpoint/2010/main" val="696935579"/>
+        <p14:creationId xmlns:p14="http://schemas.microsoft.com/office/powerpoint/2010/main" val="426741179"/>
       </p:ext>
     </p:extLst>
   </p:cSld>
@@ -5597,7 +5538,7 @@
           <p:cNvPr id="2" name="Title 1">
             <a:extLst>
               <a:ext uri="{FF2B5EF4-FFF2-40B4-BE49-F238E27FC236}">
-                <a16:creationId xmlns:a16="http://schemas.microsoft.com/office/drawing/2014/main" id="{B1DAB6A1-5409-4A48-9570-C5D93371FE3D}"/>
+                <a16:creationId xmlns:a16="http://schemas.microsoft.com/office/drawing/2014/main" id="{1400632D-DDBF-2448-83B3-F4F6E8CE14DF}"/>
               </a:ext>
             </a:extLst>
           </p:cNvPr>
@@ -5615,7 +5556,7 @@
           <a:p>
             <a:r>
               <a:rPr lang="en-US" dirty="0"/>
-              <a:t>Business Logic Verification</a:t>
+              <a:t>V6 Stored Cryptography </a:t>
             </a:r>
           </a:p>
         </p:txBody>
@@ -5625,7 +5566,7 @@
           <p:cNvPr id="3" name="Content Placeholder 2">
             <a:extLst>
               <a:ext uri="{FF2B5EF4-FFF2-40B4-BE49-F238E27FC236}">
-                <a16:creationId xmlns:a16="http://schemas.microsoft.com/office/drawing/2014/main" id="{C19D7725-B433-40ED-A135-29F4ADC4D571}"/>
+                <a16:creationId xmlns:a16="http://schemas.microsoft.com/office/drawing/2014/main" id="{23377A77-5BAF-4147-8B3F-7BD293101044}"/>
               </a:ext>
             </a:extLst>
           </p:cNvPr>
@@ -5643,68 +5584,33 @@
           <a:p>
             <a:r>
               <a:rPr lang="en-US" dirty="0"/>
-              <a:t>Major update </a:t>
-            </a:r>
-          </a:p>
-          <a:p>
-            <a:pPr lvl="1"/>
-            <a:r>
-              <a:rPr lang="en-US" dirty="0"/>
-              <a:t>Business logic step order</a:t>
-            </a:r>
-          </a:p>
-          <a:p>
-            <a:pPr lvl="1"/>
-            <a:r>
-              <a:rPr lang="en-US" dirty="0"/>
-              <a:t>Business logic human time</a:t>
-            </a:r>
-          </a:p>
-          <a:p>
-            <a:pPr lvl="1"/>
-            <a:r>
-              <a:rPr lang="en-US" dirty="0"/>
-              <a:t>Business logic limits</a:t>
-            </a:r>
-          </a:p>
-          <a:p>
-            <a:pPr lvl="1"/>
-            <a:r>
-              <a:rPr lang="en-US" dirty="0"/>
-              <a:t>Business logic anti-automation</a:t>
-            </a:r>
-          </a:p>
-          <a:p>
-            <a:pPr lvl="1"/>
-            <a:r>
-              <a:rPr lang="en-US" dirty="0"/>
-              <a:t>Threat model (attack driven design) business logic risks</a:t>
-            </a:r>
-          </a:p>
-          <a:p>
-            <a:pPr lvl="1"/>
-            <a:r>
-              <a:rPr lang="en-US" dirty="0"/>
-              <a:t>TOCTOU Race conditions that might affect business logic</a:t>
-            </a:r>
-          </a:p>
-          <a:p>
-            <a:pPr lvl="1"/>
-            <a:r>
-              <a:rPr lang="en-US" dirty="0"/>
-              <a:t>Monitoring, alerting, and detection of unusual business logic events</a:t>
-            </a:r>
-          </a:p>
-          <a:p>
-            <a:pPr lvl="1"/>
-            <a:endParaRPr lang="en-US" dirty="0"/>
+              <a:t>Data classification – only encrypt the things you need</a:t>
+            </a:r>
+          </a:p>
+          <a:p>
+            <a:r>
+              <a:rPr lang="en-US" dirty="0"/>
+              <a:t>Algorithm agility</a:t>
+            </a:r>
+          </a:p>
+          <a:p>
+            <a:r>
+              <a:rPr lang="en-US" dirty="0"/>
+              <a:t>Random values</a:t>
+            </a:r>
+          </a:p>
+          <a:p>
+            <a:r>
+              <a:rPr lang="en-US" dirty="0"/>
+              <a:t>Secret management (i.e. HSMs, TPMs, OS key stores)</a:t>
+            </a:r>
           </a:p>
         </p:txBody>
       </p:sp>
     </p:spTree>
     <p:extLst>
       <p:ext uri="{BB962C8B-B14F-4D97-AF65-F5344CB8AC3E}">
-        <p14:creationId xmlns:p14="http://schemas.microsoft.com/office/powerpoint/2010/main" val="3487119123"/>
+        <p14:creationId xmlns:p14="http://schemas.microsoft.com/office/powerpoint/2010/main" val="746642576"/>
       </p:ext>
     </p:extLst>
   </p:cSld>
@@ -5736,7 +5642,7 @@
           <p:cNvPr id="2" name="Title 1">
             <a:extLst>
               <a:ext uri="{FF2B5EF4-FFF2-40B4-BE49-F238E27FC236}">
-                <a16:creationId xmlns:a16="http://schemas.microsoft.com/office/drawing/2014/main" id="{ADE7ACEA-FC69-46CA-813D-D6FB3F348DB8}"/>
+                <a16:creationId xmlns:a16="http://schemas.microsoft.com/office/drawing/2014/main" id="{57AAE5B5-5715-D94D-AB67-4B6B894F2F01}"/>
               </a:ext>
             </a:extLst>
           </p:cNvPr>
@@ -5754,7 +5660,7 @@
           <a:p>
             <a:r>
               <a:rPr lang="en-US" dirty="0"/>
-              <a:t>Files and Resources</a:t>
+              <a:t>V7 Error handling</a:t>
             </a:r>
           </a:p>
         </p:txBody>
@@ -5764,7 +5670,7 @@
           <p:cNvPr id="3" name="Content Placeholder 2">
             <a:extLst>
               <a:ext uri="{FF2B5EF4-FFF2-40B4-BE49-F238E27FC236}">
-                <a16:creationId xmlns:a16="http://schemas.microsoft.com/office/drawing/2014/main" id="{F388339C-1CF9-44BB-9138-25D9106EDECA}"/>
+                <a16:creationId xmlns:a16="http://schemas.microsoft.com/office/drawing/2014/main" id="{AB27D460-7B86-B840-AE2A-79D6CEC0058C}"/>
               </a:ext>
             </a:extLst>
           </p:cNvPr>
@@ -5777,58 +5683,30 @@
         </p:nvSpPr>
         <p:spPr/>
         <p:txBody>
-          <a:bodyPr>
-            <a:normAutofit/>
-          </a:bodyPr>
-          <a:lstStyle/>
-          <a:p>
-            <a:r>
-              <a:rPr lang="en-US" dirty="0"/>
-              <a:t>Major revamp</a:t>
-            </a:r>
-          </a:p>
-          <a:p>
-            <a:pPr lvl="1"/>
-            <a:r>
-              <a:rPr lang="en-US" dirty="0"/>
-              <a:t>Architecture items moved to architecture</a:t>
-            </a:r>
-          </a:p>
-          <a:p>
-            <a:pPr lvl="1"/>
-            <a:r>
-              <a:rPr lang="en-US" dirty="0"/>
-              <a:t>Configuration items moved to configuration </a:t>
-            </a:r>
-          </a:p>
-          <a:p>
-            <a:r>
-              <a:rPr lang="en-US" dirty="0"/>
-              <a:t>Upload - Size and number</a:t>
-            </a:r>
-          </a:p>
-          <a:p>
-            <a:r>
-              <a:rPr lang="en-US" dirty="0"/>
-              <a:t>Contents and integrity</a:t>
-            </a:r>
-          </a:p>
-          <a:p>
-            <a:r>
-              <a:rPr lang="en-US" dirty="0"/>
-              <a:t>Storage, including malicious file detection</a:t>
-            </a:r>
-          </a:p>
-          <a:p>
-            <a:r>
-              <a:rPr lang="en-US" dirty="0"/>
-              <a:t>Execution, including LFI, RFI, and SSRF</a:t>
-            </a:r>
-          </a:p>
-          <a:p>
-            <a:r>
-              <a:rPr lang="en-US" dirty="0"/>
-              <a:t>Download</a:t>
+          <a:bodyPr/>
+          <a:lstStyle/>
+          <a:p>
+            <a:r>
+              <a:rPr lang="en-US" dirty="0"/>
+              <a:t>It’s about reducing the time to detect breaches</a:t>
+            </a:r>
+          </a:p>
+          <a:p>
+            <a:r>
+              <a:rPr lang="en-US" dirty="0"/>
+              <a:t>Don’t log everything, make it easy to detect breaches</a:t>
+            </a:r>
+          </a:p>
+          <a:p>
+            <a:r>
+              <a:rPr lang="en-US" dirty="0"/>
+              <a:t>Log protection</a:t>
+            </a:r>
+          </a:p>
+          <a:p>
+            <a:r>
+              <a:rPr lang="en-US" dirty="0"/>
+              <a:t>User friendly error handling improvements </a:t>
             </a:r>
           </a:p>
         </p:txBody>
@@ -5836,7 +5714,7 @@
     </p:spTree>
     <p:extLst>
       <p:ext uri="{BB962C8B-B14F-4D97-AF65-F5344CB8AC3E}">
-        <p14:creationId xmlns:p14="http://schemas.microsoft.com/office/powerpoint/2010/main" val="2806018304"/>
+        <p14:creationId xmlns:p14="http://schemas.microsoft.com/office/powerpoint/2010/main" val="3565768091"/>
       </p:ext>
     </p:extLst>
   </p:cSld>
@@ -5868,7 +5746,7 @@
           <p:cNvPr id="2" name="Title 1">
             <a:extLst>
               <a:ext uri="{FF2B5EF4-FFF2-40B4-BE49-F238E27FC236}">
-                <a16:creationId xmlns:a16="http://schemas.microsoft.com/office/drawing/2014/main" id="{FFE54F60-A25D-4DB0-AF76-AC50FD8A57D1}"/>
+                <a16:creationId xmlns:a16="http://schemas.microsoft.com/office/drawing/2014/main" id="{394BEC75-C7E7-B44F-9FEF-4503910656DF}"/>
               </a:ext>
             </a:extLst>
           </p:cNvPr>
@@ -5886,7 +5764,7 @@
           <a:p>
             <a:r>
               <a:rPr lang="en-US" dirty="0"/>
-              <a:t>API Security</a:t>
+              <a:t>V8 Data Protection</a:t>
             </a:r>
           </a:p>
         </p:txBody>
@@ -5896,7 +5774,7 @@
           <p:cNvPr id="3" name="Content Placeholder 2">
             <a:extLst>
               <a:ext uri="{FF2B5EF4-FFF2-40B4-BE49-F238E27FC236}">
-                <a16:creationId xmlns:a16="http://schemas.microsoft.com/office/drawing/2014/main" id="{9FE0AC28-2A2E-4CB3-86B5-C76B48F959C4}"/>
+                <a16:creationId xmlns:a16="http://schemas.microsoft.com/office/drawing/2014/main" id="{40327572-8770-A043-AC19-FA9C380032DE}"/>
               </a:ext>
             </a:extLst>
           </p:cNvPr>
@@ -5914,56 +5792,42 @@
           <a:p>
             <a:r>
               <a:rPr lang="en-US" dirty="0"/>
-              <a:t>Total revamp</a:t>
-            </a:r>
-          </a:p>
-          <a:p>
-            <a:endParaRPr lang="en-US" dirty="0"/>
-          </a:p>
-          <a:p>
-            <a:r>
-              <a:rPr lang="en-US" dirty="0"/>
-              <a:t>General controls include common sense API controls</a:t>
+              <a:t>Protecting the most important data assets</a:t>
+            </a:r>
+          </a:p>
+          <a:p>
+            <a:r>
+              <a:rPr lang="en-US" dirty="0"/>
+              <a:t>Sensitive Private Data Protection</a:t>
             </a:r>
           </a:p>
           <a:p>
             <a:pPr lvl="1"/>
             <a:r>
               <a:rPr lang="en-US" dirty="0"/>
-              <a:t>Must be read in conjunction with authentication, authorization and session management</a:t>
-            </a:r>
-          </a:p>
-          <a:p>
-            <a:r>
-              <a:rPr lang="en-US" dirty="0"/>
-              <a:t>RESTful includes schema validation, CORS and origin attacks</a:t>
-            </a:r>
-          </a:p>
-          <a:p>
-            <a:r>
-              <a:rPr lang="en-US" dirty="0"/>
-              <a:t>SOAP – fewer more impactful items, far clearer, and not obfuscated </a:t>
-            </a:r>
-          </a:p>
-          <a:p>
+              <a:t>Covers many technical requirements for GDPR and other privacy laws</a:t>
+            </a:r>
+          </a:p>
+          <a:p>
+            <a:r>
+              <a:rPr lang="en-US" dirty="0"/>
+              <a:t>Client side protection (HTML 5 local storage </a:t>
+            </a:r>
             <a:r>
               <a:rPr lang="en-US" dirty="0" err="1"/>
-              <a:t>GraphQL</a:t>
-            </a:r>
-            <a:r>
-              <a:rPr lang="en-US" dirty="0"/>
-              <a:t> and Web Service Data Layer</a:t>
-            </a:r>
-          </a:p>
-          <a:p>
-            <a:endParaRPr lang="en-US" dirty="0"/>
+              <a:t>etc</a:t>
+            </a:r>
+            <a:r>
+              <a:rPr lang="en-US" dirty="0"/>
+              <a:t>)</a:t>
+            </a:r>
           </a:p>
         </p:txBody>
       </p:sp>
     </p:spTree>
     <p:extLst>
       <p:ext uri="{BB962C8B-B14F-4D97-AF65-F5344CB8AC3E}">
-        <p14:creationId xmlns:p14="http://schemas.microsoft.com/office/powerpoint/2010/main" val="4001430704"/>
+        <p14:creationId xmlns:p14="http://schemas.microsoft.com/office/powerpoint/2010/main" val="2909221787"/>
       </p:ext>
     </p:extLst>
   </p:cSld>
@@ -5995,7 +5859,7 @@
           <p:cNvPr id="2" name="Title 1">
             <a:extLst>
               <a:ext uri="{FF2B5EF4-FFF2-40B4-BE49-F238E27FC236}">
-                <a16:creationId xmlns:a16="http://schemas.microsoft.com/office/drawing/2014/main" id="{DCCC058E-8602-4A7D-A2FA-D97476E2C2F0}"/>
+                <a16:creationId xmlns:a16="http://schemas.microsoft.com/office/drawing/2014/main" id="{3B9FE9B9-5241-4843-B2B4-F5E75738EBC8}"/>
               </a:ext>
             </a:extLst>
           </p:cNvPr>
@@ -6013,7 +5877,7 @@
           <a:p>
             <a:r>
               <a:rPr lang="en-US" dirty="0"/>
-              <a:t>Configuration</a:t>
+              <a:t>V9 Communications Security</a:t>
             </a:r>
           </a:p>
         </p:txBody>
@@ -6023,7 +5887,7 @@
           <p:cNvPr id="3" name="Content Placeholder 2">
             <a:extLst>
               <a:ext uri="{FF2B5EF4-FFF2-40B4-BE49-F238E27FC236}">
-                <a16:creationId xmlns:a16="http://schemas.microsoft.com/office/drawing/2014/main" id="{BE4F65F3-6B22-49A1-A02E-7F43A4A4B97B}"/>
+                <a16:creationId xmlns:a16="http://schemas.microsoft.com/office/drawing/2014/main" id="{73EB383F-1209-4CCF-B1D1-C993D4A6E98F}"/>
               </a:ext>
             </a:extLst>
           </p:cNvPr>
@@ -6041,19 +5905,7 @@
           <a:p>
             <a:r>
               <a:rPr lang="en-US" dirty="0"/>
-              <a:t>Major revamp</a:t>
-            </a:r>
-          </a:p>
-          <a:p>
-            <a:r>
-              <a:rPr lang="en-US" dirty="0"/>
-              <a:t>Repeatable, Continuous integration, continuous deployment</a:t>
-            </a:r>
-          </a:p>
-          <a:p>
-            <a:r>
-              <a:rPr lang="en-US" dirty="0"/>
-              <a:t>Support for </a:t>
+              <a:t>Now </a:t>
             </a:r>
             <a:r>
               <a:rPr lang="en-US" dirty="0" err="1"/>
@@ -6061,31 +5913,42 @@
             </a:r>
             <a:r>
               <a:rPr lang="en-US" dirty="0"/>
-              <a:t> culture and agile practices</a:t>
-            </a:r>
-          </a:p>
-          <a:p>
-            <a:r>
-              <a:rPr lang="en-US" dirty="0"/>
-              <a:t>Containers</a:t>
-            </a:r>
-          </a:p>
-          <a:p>
-            <a:r>
-              <a:rPr lang="en-US" dirty="0"/>
-              <a:t>Dependency checks mandated</a:t>
-            </a:r>
-          </a:p>
-          <a:p>
-            <a:r>
-              <a:rPr lang="en-US" dirty="0"/>
-              <a:t>Sandboxing components including uploaded assets</a:t>
-            </a:r>
-          </a:p>
-          <a:p>
-            <a:r>
-              <a:rPr lang="en-US" dirty="0"/>
-              <a:t>Sub-domain takeover</a:t>
+              <a:t> friendly</a:t>
+            </a:r>
+          </a:p>
+          <a:p>
+            <a:pPr lvl="1"/>
+            <a:r>
+              <a:rPr lang="en-US" dirty="0"/>
+              <a:t>No more building a secure chain / path … what does that even mean?</a:t>
+            </a:r>
+          </a:p>
+          <a:p>
+            <a:pPr lvl="1"/>
+            <a:endParaRPr lang="en-US" dirty="0"/>
+          </a:p>
+          <a:p>
+            <a:r>
+              <a:rPr lang="en-US" dirty="0"/>
+              <a:t>Easier to comply … automatically</a:t>
+            </a:r>
+          </a:p>
+          <a:p>
+            <a:r>
+              <a:rPr lang="en-US" dirty="0"/>
+              <a:t>TLS all the things</a:t>
+            </a:r>
+          </a:p>
+          <a:p>
+            <a:r>
+              <a:rPr lang="en-US" dirty="0"/>
+              <a:t>Use modern configuration builders</a:t>
+            </a:r>
+          </a:p>
+          <a:p>
+            <a:r>
+              <a:rPr lang="en-US" dirty="0"/>
+              <a:t>Use the verification tools you use today</a:t>
             </a:r>
           </a:p>
           <a:p>
@@ -6096,7 +5959,7 @@
     </p:spTree>
     <p:extLst>
       <p:ext uri="{BB962C8B-B14F-4D97-AF65-F5344CB8AC3E}">
-        <p14:creationId xmlns:p14="http://schemas.microsoft.com/office/powerpoint/2010/main" val="1599648678"/>
+        <p14:creationId xmlns:p14="http://schemas.microsoft.com/office/powerpoint/2010/main" val="3078731923"/>
       </p:ext>
     </p:extLst>
   </p:cSld>
@@ -6128,7 +5991,7 @@
           <p:cNvPr id="2" name="Title 1">
             <a:extLst>
               <a:ext uri="{FF2B5EF4-FFF2-40B4-BE49-F238E27FC236}">
-                <a16:creationId xmlns:a16="http://schemas.microsoft.com/office/drawing/2014/main" id="{915AE611-4460-8948-B7BC-F2FD6EC2F44C}"/>
+                <a16:creationId xmlns:a16="http://schemas.microsoft.com/office/drawing/2014/main" id="{70960941-4527-43AA-8F91-9932601B3E06}"/>
               </a:ext>
             </a:extLst>
           </p:cNvPr>
@@ -6146,40 +6009,87 @@
           <a:p>
             <a:r>
               <a:rPr lang="en-US" dirty="0"/>
-              <a:t>I’m in. How do I use it?</a:t>
-            </a:r>
-          </a:p>
-        </p:txBody>
-      </p:sp>
-      <p:sp>
-        <p:nvSpPr>
-          <p:cNvPr id="3" name="Text Placeholder 2">
-            <a:extLst>
-              <a:ext uri="{FF2B5EF4-FFF2-40B4-BE49-F238E27FC236}">
-                <a16:creationId xmlns:a16="http://schemas.microsoft.com/office/drawing/2014/main" id="{667F36DC-9B34-2F45-A88C-000F7A52E21E}"/>
-              </a:ext>
-            </a:extLst>
-          </p:cNvPr>
-          <p:cNvSpPr>
-            <a:spLocks noGrp="1"/>
-          </p:cNvSpPr>
-          <p:nvPr>
-            <p:ph type="body" idx="1"/>
-          </p:nvPr>
-        </p:nvSpPr>
-        <p:spPr/>
-        <p:txBody>
-          <a:bodyPr/>
-          <a:lstStyle/>
-          <a:p>
-            <a:endParaRPr lang="en-US"/>
+              <a:t>V10 Malicious Code</a:t>
+            </a:r>
+          </a:p>
+        </p:txBody>
+      </p:sp>
+      <p:sp>
+        <p:nvSpPr>
+          <p:cNvPr id="3" name="Content Placeholder 2">
+            <a:extLst>
+              <a:ext uri="{FF2B5EF4-FFF2-40B4-BE49-F238E27FC236}">
+                <a16:creationId xmlns:a16="http://schemas.microsoft.com/office/drawing/2014/main" id="{50573F35-2C9D-43C1-AEB2-A77410643D05}"/>
+              </a:ext>
+            </a:extLst>
+          </p:cNvPr>
+          <p:cNvSpPr>
+            <a:spLocks noGrp="1"/>
+          </p:cNvSpPr>
+          <p:nvPr>
+            <p:ph idx="1"/>
+          </p:nvPr>
+        </p:nvSpPr>
+        <p:spPr/>
+        <p:txBody>
+          <a:bodyPr/>
+          <a:lstStyle/>
+          <a:p>
+            <a:r>
+              <a:rPr lang="en-US" dirty="0"/>
+              <a:t>Major update to this section to cover more than just time bombs and Easter eggs</a:t>
+            </a:r>
+          </a:p>
+          <a:p>
+            <a:pPr lvl="1"/>
+            <a:r>
+              <a:rPr lang="en-US" dirty="0"/>
+              <a:t>Detect malicious code introduction </a:t>
+            </a:r>
+          </a:p>
+          <a:p>
+            <a:pPr lvl="1"/>
+            <a:r>
+              <a:rPr lang="en-US" dirty="0"/>
+              <a:t>Continuous detection through building</a:t>
+            </a:r>
+          </a:p>
+          <a:p>
+            <a:pPr lvl="1"/>
+            <a:r>
+              <a:rPr lang="en-US" dirty="0"/>
+              <a:t>Privacy invading libraries (Google’s PUA) mentioned for first time</a:t>
+            </a:r>
+          </a:p>
+          <a:p>
+            <a:pPr lvl="1"/>
+            <a:r>
+              <a:rPr lang="en-US" dirty="0"/>
+              <a:t>Malicious business logic, such as salami attacks</a:t>
+            </a:r>
+          </a:p>
+          <a:p>
+            <a:pPr lvl="1"/>
+            <a:r>
+              <a:rPr lang="en-US" dirty="0"/>
+              <a:t>Privacy invading permissions (camera, location, microphone, contacts, etc)</a:t>
+            </a:r>
+          </a:p>
+          <a:p>
+            <a:endParaRPr lang="en-US" dirty="0"/>
+          </a:p>
+          <a:p>
+            <a:r>
+              <a:rPr lang="en-US" dirty="0"/>
+              <a:t>Mostly Level 3 for apps that can kill you or run the world economy</a:t>
+            </a:r>
           </a:p>
         </p:txBody>
       </p:sp>
     </p:spTree>
     <p:extLst>
       <p:ext uri="{BB962C8B-B14F-4D97-AF65-F5344CB8AC3E}">
-        <p14:creationId xmlns:p14="http://schemas.microsoft.com/office/powerpoint/2010/main" val="32872434"/>
+        <p14:creationId xmlns:p14="http://schemas.microsoft.com/office/powerpoint/2010/main" val="696935579"/>
       </p:ext>
     </p:extLst>
   </p:cSld>
@@ -6211,7 +6121,7 @@
           <p:cNvPr id="2" name="Title 1">
             <a:extLst>
               <a:ext uri="{FF2B5EF4-FFF2-40B4-BE49-F238E27FC236}">
-                <a16:creationId xmlns:a16="http://schemas.microsoft.com/office/drawing/2014/main" id="{636CEFAB-D61E-4F0E-B55C-B11DE4E57E92}"/>
+                <a16:creationId xmlns:a16="http://schemas.microsoft.com/office/drawing/2014/main" id="{B1DAB6A1-5409-4A48-9570-C5D93371FE3D}"/>
               </a:ext>
             </a:extLst>
           </p:cNvPr>
@@ -6229,7 +6139,7 @@
           <a:p>
             <a:r>
               <a:rPr lang="en-US" dirty="0"/>
-              <a:t>When can I get it?</a:t>
+              <a:t>V11 Business Logic Verification</a:t>
             </a:r>
           </a:p>
         </p:txBody>
@@ -6239,7 +6149,7 @@
           <p:cNvPr id="3" name="Content Placeholder 2">
             <a:extLst>
               <a:ext uri="{FF2B5EF4-FFF2-40B4-BE49-F238E27FC236}">
-                <a16:creationId xmlns:a16="http://schemas.microsoft.com/office/drawing/2014/main" id="{AAB61F75-05F8-4872-86BB-9C8368D38246}"/>
+                <a16:creationId xmlns:a16="http://schemas.microsoft.com/office/drawing/2014/main" id="{C19D7725-B433-40ED-A135-29F4ADC4D571}"/>
               </a:ext>
             </a:extLst>
           </p:cNvPr>
@@ -6257,40 +6167,60 @@
           <a:p>
             <a:r>
               <a:rPr lang="en-US" dirty="0"/>
-              <a:t>The ASVS 4.0 Final is available now! </a:t>
-            </a:r>
-          </a:p>
-          <a:p>
-            <a:endParaRPr lang="en-US" dirty="0"/>
-          </a:p>
-          <a:p>
-            <a:r>
-              <a:rPr lang="en-US" dirty="0"/>
-              <a:t>OWASP Wiki – Word, PDFs, CSVs, and Hot Linkable markdown</a:t>
-            </a:r>
-          </a:p>
-          <a:p>
-            <a:r>
-              <a:rPr lang="en-US" dirty="0"/>
-              <a:t>GitHub - Final Version is in the 4.0 branch</a:t>
-            </a:r>
-          </a:p>
-          <a:p>
-            <a:r>
-              <a:rPr lang="en-US" dirty="0"/>
-              <a:t>GitHub – Development Version is in the master branch</a:t>
-            </a:r>
-          </a:p>
-          <a:p>
-            <a:endParaRPr lang="en-US" dirty="0"/>
-          </a:p>
-          <a:p>
-            <a:r>
-              <a:rPr lang="en-US" dirty="0"/>
-              <a:t>You can also get this presentation so you can give this to your local chapter, school, college, or workplace!</a:t>
-            </a:r>
-          </a:p>
-          <a:p>
+              <a:t>Major update </a:t>
+            </a:r>
+          </a:p>
+          <a:p>
+            <a:pPr lvl="1"/>
+            <a:r>
+              <a:rPr lang="en-US" dirty="0"/>
+              <a:t>Business logic step order</a:t>
+            </a:r>
+          </a:p>
+          <a:p>
+            <a:pPr lvl="1"/>
+            <a:r>
+              <a:rPr lang="en-US" dirty="0"/>
+              <a:t>Business logic human time</a:t>
+            </a:r>
+          </a:p>
+          <a:p>
+            <a:pPr lvl="1"/>
+            <a:r>
+              <a:rPr lang="en-US" dirty="0"/>
+              <a:t>Business logic limits</a:t>
+            </a:r>
+          </a:p>
+          <a:p>
+            <a:pPr lvl="1"/>
+            <a:r>
+              <a:rPr lang="en-US" dirty="0"/>
+              <a:t>Business logic anti-automation</a:t>
+            </a:r>
+          </a:p>
+          <a:p>
+            <a:pPr lvl="1"/>
+            <a:r>
+              <a:rPr lang="en-US" dirty="0"/>
+              <a:t>Threat model (attack driven design) business logic risks</a:t>
+            </a:r>
+          </a:p>
+          <a:p>
+            <a:pPr lvl="1"/>
+            <a:r>
+              <a:rPr lang="en-US" dirty="0"/>
+              <a:t>TOCTOU Race conditions that might affect business logic</a:t>
+            </a:r>
+          </a:p>
+          <a:p>
+            <a:pPr lvl="1"/>
+            <a:r>
+              <a:rPr lang="en-US" dirty="0"/>
+              <a:t>Monitoring, alerting, and detection of unusual business logic events</a:t>
+            </a:r>
+          </a:p>
+          <a:p>
+            <a:pPr lvl="1"/>
             <a:endParaRPr lang="en-US" dirty="0"/>
           </a:p>
         </p:txBody>
@@ -6298,7 +6228,7 @@
     </p:spTree>
     <p:extLst>
       <p:ext uri="{BB962C8B-B14F-4D97-AF65-F5344CB8AC3E}">
-        <p14:creationId xmlns:p14="http://schemas.microsoft.com/office/powerpoint/2010/main" val="1840743557"/>
+        <p14:creationId xmlns:p14="http://schemas.microsoft.com/office/powerpoint/2010/main" val="3487119123"/>
       </p:ext>
     </p:extLst>
   </p:cSld>
@@ -6309,6 +6239,601 @@
 </file>
 
 <file path=ppt/slides/slide26.xml><?xml version="1.0" encoding="utf-8"?>
+<p:sld xmlns:a="http://schemas.openxmlformats.org/drawingml/2006/main" xmlns:r="http://schemas.openxmlformats.org/officeDocument/2006/relationships" xmlns:p="http://schemas.openxmlformats.org/presentationml/2006/main">
+  <p:cSld>
+    <p:spTree>
+      <p:nvGrpSpPr>
+        <p:cNvPr id="1" name=""/>
+        <p:cNvGrpSpPr/>
+        <p:nvPr/>
+      </p:nvGrpSpPr>
+      <p:grpSpPr>
+        <a:xfrm>
+          <a:off x="0" y="0"/>
+          <a:ext cx="0" cy="0"/>
+          <a:chOff x="0" y="0"/>
+          <a:chExt cx="0" cy="0"/>
+        </a:xfrm>
+      </p:grpSpPr>
+      <p:sp>
+        <p:nvSpPr>
+          <p:cNvPr id="2" name="Title 1">
+            <a:extLst>
+              <a:ext uri="{FF2B5EF4-FFF2-40B4-BE49-F238E27FC236}">
+                <a16:creationId xmlns:a16="http://schemas.microsoft.com/office/drawing/2014/main" id="{ADE7ACEA-FC69-46CA-813D-D6FB3F348DB8}"/>
+              </a:ext>
+            </a:extLst>
+          </p:cNvPr>
+          <p:cNvSpPr>
+            <a:spLocks noGrp="1"/>
+          </p:cNvSpPr>
+          <p:nvPr>
+            <p:ph type="title"/>
+          </p:nvPr>
+        </p:nvSpPr>
+        <p:spPr/>
+        <p:txBody>
+          <a:bodyPr/>
+          <a:lstStyle/>
+          <a:p>
+            <a:r>
+              <a:rPr lang="en-US" dirty="0"/>
+              <a:t>V12 Files and Resources</a:t>
+            </a:r>
+          </a:p>
+        </p:txBody>
+      </p:sp>
+      <p:sp>
+        <p:nvSpPr>
+          <p:cNvPr id="3" name="Content Placeholder 2">
+            <a:extLst>
+              <a:ext uri="{FF2B5EF4-FFF2-40B4-BE49-F238E27FC236}">
+                <a16:creationId xmlns:a16="http://schemas.microsoft.com/office/drawing/2014/main" id="{F388339C-1CF9-44BB-9138-25D9106EDECA}"/>
+              </a:ext>
+            </a:extLst>
+          </p:cNvPr>
+          <p:cNvSpPr>
+            <a:spLocks noGrp="1"/>
+          </p:cNvSpPr>
+          <p:nvPr>
+            <p:ph idx="1"/>
+          </p:nvPr>
+        </p:nvSpPr>
+        <p:spPr/>
+        <p:txBody>
+          <a:bodyPr>
+            <a:normAutofit/>
+          </a:bodyPr>
+          <a:lstStyle/>
+          <a:p>
+            <a:r>
+              <a:rPr lang="en-US" dirty="0"/>
+              <a:t>Major revamp</a:t>
+            </a:r>
+          </a:p>
+          <a:p>
+            <a:pPr lvl="1"/>
+            <a:r>
+              <a:rPr lang="en-US" dirty="0"/>
+              <a:t>Architecture items moved to architecture</a:t>
+            </a:r>
+          </a:p>
+          <a:p>
+            <a:pPr lvl="1"/>
+            <a:r>
+              <a:rPr lang="en-US" dirty="0"/>
+              <a:t>Configuration items moved to configuration </a:t>
+            </a:r>
+          </a:p>
+          <a:p>
+            <a:r>
+              <a:rPr lang="en-US" dirty="0"/>
+              <a:t>Upload - Size and number</a:t>
+            </a:r>
+          </a:p>
+          <a:p>
+            <a:r>
+              <a:rPr lang="en-US" dirty="0"/>
+              <a:t>Contents and integrity</a:t>
+            </a:r>
+          </a:p>
+          <a:p>
+            <a:r>
+              <a:rPr lang="en-US" dirty="0"/>
+              <a:t>Storage, including malicious file detection</a:t>
+            </a:r>
+          </a:p>
+          <a:p>
+            <a:r>
+              <a:rPr lang="en-US" dirty="0"/>
+              <a:t>Execution, including LFI, RFI, and SSRF</a:t>
+            </a:r>
+          </a:p>
+          <a:p>
+            <a:r>
+              <a:rPr lang="en-US" dirty="0"/>
+              <a:t>Download</a:t>
+            </a:r>
+          </a:p>
+        </p:txBody>
+      </p:sp>
+    </p:spTree>
+    <p:extLst>
+      <p:ext uri="{BB962C8B-B14F-4D97-AF65-F5344CB8AC3E}">
+        <p14:creationId xmlns:p14="http://schemas.microsoft.com/office/powerpoint/2010/main" val="2806018304"/>
+      </p:ext>
+    </p:extLst>
+  </p:cSld>
+  <p:clrMapOvr>
+    <a:masterClrMapping/>
+  </p:clrMapOvr>
+</p:sld>
+</file>
+
+<file path=ppt/slides/slide27.xml><?xml version="1.0" encoding="utf-8"?>
+<p:sld xmlns:a="http://schemas.openxmlformats.org/drawingml/2006/main" xmlns:r="http://schemas.openxmlformats.org/officeDocument/2006/relationships" xmlns:p="http://schemas.openxmlformats.org/presentationml/2006/main">
+  <p:cSld>
+    <p:spTree>
+      <p:nvGrpSpPr>
+        <p:cNvPr id="1" name=""/>
+        <p:cNvGrpSpPr/>
+        <p:nvPr/>
+      </p:nvGrpSpPr>
+      <p:grpSpPr>
+        <a:xfrm>
+          <a:off x="0" y="0"/>
+          <a:ext cx="0" cy="0"/>
+          <a:chOff x="0" y="0"/>
+          <a:chExt cx="0" cy="0"/>
+        </a:xfrm>
+      </p:grpSpPr>
+      <p:sp>
+        <p:nvSpPr>
+          <p:cNvPr id="2" name="Title 1">
+            <a:extLst>
+              <a:ext uri="{FF2B5EF4-FFF2-40B4-BE49-F238E27FC236}">
+                <a16:creationId xmlns:a16="http://schemas.microsoft.com/office/drawing/2014/main" id="{FFE54F60-A25D-4DB0-AF76-AC50FD8A57D1}"/>
+              </a:ext>
+            </a:extLst>
+          </p:cNvPr>
+          <p:cNvSpPr>
+            <a:spLocks noGrp="1"/>
+          </p:cNvSpPr>
+          <p:nvPr>
+            <p:ph type="title"/>
+          </p:nvPr>
+        </p:nvSpPr>
+        <p:spPr/>
+        <p:txBody>
+          <a:bodyPr/>
+          <a:lstStyle/>
+          <a:p>
+            <a:r>
+              <a:rPr lang="en-US" dirty="0"/>
+              <a:t>V13 API Security</a:t>
+            </a:r>
+          </a:p>
+        </p:txBody>
+      </p:sp>
+      <p:sp>
+        <p:nvSpPr>
+          <p:cNvPr id="3" name="Content Placeholder 2">
+            <a:extLst>
+              <a:ext uri="{FF2B5EF4-FFF2-40B4-BE49-F238E27FC236}">
+                <a16:creationId xmlns:a16="http://schemas.microsoft.com/office/drawing/2014/main" id="{9FE0AC28-2A2E-4CB3-86B5-C76B48F959C4}"/>
+              </a:ext>
+            </a:extLst>
+          </p:cNvPr>
+          <p:cNvSpPr>
+            <a:spLocks noGrp="1"/>
+          </p:cNvSpPr>
+          <p:nvPr>
+            <p:ph idx="1"/>
+          </p:nvPr>
+        </p:nvSpPr>
+        <p:spPr/>
+        <p:txBody>
+          <a:bodyPr/>
+          <a:lstStyle/>
+          <a:p>
+            <a:r>
+              <a:rPr lang="en-US" dirty="0"/>
+              <a:t>Total revamp</a:t>
+            </a:r>
+          </a:p>
+          <a:p>
+            <a:endParaRPr lang="en-US" dirty="0"/>
+          </a:p>
+          <a:p>
+            <a:r>
+              <a:rPr lang="en-US" dirty="0"/>
+              <a:t>General controls include common sense API controls</a:t>
+            </a:r>
+          </a:p>
+          <a:p>
+            <a:pPr lvl="1"/>
+            <a:r>
+              <a:rPr lang="en-US" dirty="0"/>
+              <a:t>Must be read in conjunction with authentication, authorization and session management</a:t>
+            </a:r>
+          </a:p>
+          <a:p>
+            <a:r>
+              <a:rPr lang="en-US" dirty="0"/>
+              <a:t>RESTful includes schema validation, CORS and origin attacks</a:t>
+            </a:r>
+          </a:p>
+          <a:p>
+            <a:r>
+              <a:rPr lang="en-US" dirty="0"/>
+              <a:t>SOAP – fewer more impactful items, far clearer, and not obfuscated </a:t>
+            </a:r>
+          </a:p>
+          <a:p>
+            <a:r>
+              <a:rPr lang="en-US" dirty="0" err="1"/>
+              <a:t>GraphQL</a:t>
+            </a:r>
+            <a:r>
+              <a:rPr lang="en-US" dirty="0"/>
+              <a:t> and Web Service Data Layer</a:t>
+            </a:r>
+          </a:p>
+          <a:p>
+            <a:endParaRPr lang="en-US" dirty="0"/>
+          </a:p>
+        </p:txBody>
+      </p:sp>
+    </p:spTree>
+    <p:extLst>
+      <p:ext uri="{BB962C8B-B14F-4D97-AF65-F5344CB8AC3E}">
+        <p14:creationId xmlns:p14="http://schemas.microsoft.com/office/powerpoint/2010/main" val="4001430704"/>
+      </p:ext>
+    </p:extLst>
+  </p:cSld>
+  <p:clrMapOvr>
+    <a:masterClrMapping/>
+  </p:clrMapOvr>
+</p:sld>
+</file>
+
+<file path=ppt/slides/slide28.xml><?xml version="1.0" encoding="utf-8"?>
+<p:sld xmlns:a="http://schemas.openxmlformats.org/drawingml/2006/main" xmlns:r="http://schemas.openxmlformats.org/officeDocument/2006/relationships" xmlns:p="http://schemas.openxmlformats.org/presentationml/2006/main">
+  <p:cSld>
+    <p:spTree>
+      <p:nvGrpSpPr>
+        <p:cNvPr id="1" name=""/>
+        <p:cNvGrpSpPr/>
+        <p:nvPr/>
+      </p:nvGrpSpPr>
+      <p:grpSpPr>
+        <a:xfrm>
+          <a:off x="0" y="0"/>
+          <a:ext cx="0" cy="0"/>
+          <a:chOff x="0" y="0"/>
+          <a:chExt cx="0" cy="0"/>
+        </a:xfrm>
+      </p:grpSpPr>
+      <p:sp>
+        <p:nvSpPr>
+          <p:cNvPr id="2" name="Title 1">
+            <a:extLst>
+              <a:ext uri="{FF2B5EF4-FFF2-40B4-BE49-F238E27FC236}">
+                <a16:creationId xmlns:a16="http://schemas.microsoft.com/office/drawing/2014/main" id="{DCCC058E-8602-4A7D-A2FA-D97476E2C2F0}"/>
+              </a:ext>
+            </a:extLst>
+          </p:cNvPr>
+          <p:cNvSpPr>
+            <a:spLocks noGrp="1"/>
+          </p:cNvSpPr>
+          <p:nvPr>
+            <p:ph type="title"/>
+          </p:nvPr>
+        </p:nvSpPr>
+        <p:spPr/>
+        <p:txBody>
+          <a:bodyPr/>
+          <a:lstStyle/>
+          <a:p>
+            <a:r>
+              <a:rPr lang="en-US" dirty="0"/>
+              <a:t>V14 Configuration</a:t>
+            </a:r>
+          </a:p>
+        </p:txBody>
+      </p:sp>
+      <p:sp>
+        <p:nvSpPr>
+          <p:cNvPr id="3" name="Content Placeholder 2">
+            <a:extLst>
+              <a:ext uri="{FF2B5EF4-FFF2-40B4-BE49-F238E27FC236}">
+                <a16:creationId xmlns:a16="http://schemas.microsoft.com/office/drawing/2014/main" id="{BE4F65F3-6B22-49A1-A02E-7F43A4A4B97B}"/>
+              </a:ext>
+            </a:extLst>
+          </p:cNvPr>
+          <p:cNvSpPr>
+            <a:spLocks noGrp="1"/>
+          </p:cNvSpPr>
+          <p:nvPr>
+            <p:ph idx="1"/>
+          </p:nvPr>
+        </p:nvSpPr>
+        <p:spPr/>
+        <p:txBody>
+          <a:bodyPr/>
+          <a:lstStyle/>
+          <a:p>
+            <a:r>
+              <a:rPr lang="en-US" dirty="0"/>
+              <a:t>Major revamp</a:t>
+            </a:r>
+          </a:p>
+          <a:p>
+            <a:r>
+              <a:rPr lang="en-US" dirty="0"/>
+              <a:t>Repeatable, Continuous integration, continuous deployment</a:t>
+            </a:r>
+          </a:p>
+          <a:p>
+            <a:r>
+              <a:rPr lang="en-US" dirty="0"/>
+              <a:t>Support for </a:t>
+            </a:r>
+            <a:r>
+              <a:rPr lang="en-US" dirty="0" err="1"/>
+              <a:t>DevSecOps</a:t>
+            </a:r>
+            <a:r>
+              <a:rPr lang="en-US" dirty="0"/>
+              <a:t> culture and agile practices</a:t>
+            </a:r>
+          </a:p>
+          <a:p>
+            <a:r>
+              <a:rPr lang="en-US" dirty="0"/>
+              <a:t>Containers</a:t>
+            </a:r>
+          </a:p>
+          <a:p>
+            <a:r>
+              <a:rPr lang="en-US" dirty="0"/>
+              <a:t>Dependency checks mandated</a:t>
+            </a:r>
+          </a:p>
+          <a:p>
+            <a:r>
+              <a:rPr lang="en-US" dirty="0"/>
+              <a:t>Sandboxing components including uploaded assets</a:t>
+            </a:r>
+          </a:p>
+          <a:p>
+            <a:r>
+              <a:rPr lang="en-US" dirty="0"/>
+              <a:t>Sub-domain takeover</a:t>
+            </a:r>
+          </a:p>
+          <a:p>
+            <a:endParaRPr lang="en-US" dirty="0"/>
+          </a:p>
+        </p:txBody>
+      </p:sp>
+    </p:spTree>
+    <p:extLst>
+      <p:ext uri="{BB962C8B-B14F-4D97-AF65-F5344CB8AC3E}">
+        <p14:creationId xmlns:p14="http://schemas.microsoft.com/office/powerpoint/2010/main" val="1599648678"/>
+      </p:ext>
+    </p:extLst>
+  </p:cSld>
+  <p:clrMapOvr>
+    <a:masterClrMapping/>
+  </p:clrMapOvr>
+</p:sld>
+</file>
+
+<file path=ppt/slides/slide29.xml><?xml version="1.0" encoding="utf-8"?>
+<p:sld xmlns:a="http://schemas.openxmlformats.org/drawingml/2006/main" xmlns:r="http://schemas.openxmlformats.org/officeDocument/2006/relationships" xmlns:p="http://schemas.openxmlformats.org/presentationml/2006/main">
+  <p:cSld>
+    <p:spTree>
+      <p:nvGrpSpPr>
+        <p:cNvPr id="1" name=""/>
+        <p:cNvGrpSpPr/>
+        <p:nvPr/>
+      </p:nvGrpSpPr>
+      <p:grpSpPr>
+        <a:xfrm>
+          <a:off x="0" y="0"/>
+          <a:ext cx="0" cy="0"/>
+          <a:chOff x="0" y="0"/>
+          <a:chExt cx="0" cy="0"/>
+        </a:xfrm>
+      </p:grpSpPr>
+      <p:sp>
+        <p:nvSpPr>
+          <p:cNvPr id="2" name="Title 1">
+            <a:extLst>
+              <a:ext uri="{FF2B5EF4-FFF2-40B4-BE49-F238E27FC236}">
+                <a16:creationId xmlns:a16="http://schemas.microsoft.com/office/drawing/2014/main" id="{915AE611-4460-8948-B7BC-F2FD6EC2F44C}"/>
+              </a:ext>
+            </a:extLst>
+          </p:cNvPr>
+          <p:cNvSpPr>
+            <a:spLocks noGrp="1"/>
+          </p:cNvSpPr>
+          <p:nvPr>
+            <p:ph type="title"/>
+          </p:nvPr>
+        </p:nvSpPr>
+        <p:spPr/>
+        <p:txBody>
+          <a:bodyPr/>
+          <a:lstStyle/>
+          <a:p>
+            <a:r>
+              <a:rPr lang="en-US" dirty="0"/>
+              <a:t>I’m in. How do I use it?</a:t>
+            </a:r>
+          </a:p>
+        </p:txBody>
+      </p:sp>
+      <p:sp>
+        <p:nvSpPr>
+          <p:cNvPr id="3" name="Text Placeholder 2">
+            <a:extLst>
+              <a:ext uri="{FF2B5EF4-FFF2-40B4-BE49-F238E27FC236}">
+                <a16:creationId xmlns:a16="http://schemas.microsoft.com/office/drawing/2014/main" id="{667F36DC-9B34-2F45-A88C-000F7A52E21E}"/>
+              </a:ext>
+            </a:extLst>
+          </p:cNvPr>
+          <p:cNvSpPr>
+            <a:spLocks noGrp="1"/>
+          </p:cNvSpPr>
+          <p:nvPr>
+            <p:ph type="body" idx="1"/>
+          </p:nvPr>
+        </p:nvSpPr>
+        <p:spPr/>
+        <p:txBody>
+          <a:bodyPr/>
+          <a:lstStyle/>
+          <a:p>
+            <a:endParaRPr lang="en-US"/>
+          </a:p>
+        </p:txBody>
+      </p:sp>
+    </p:spTree>
+    <p:extLst>
+      <p:ext uri="{BB962C8B-B14F-4D97-AF65-F5344CB8AC3E}">
+        <p14:creationId xmlns:p14="http://schemas.microsoft.com/office/powerpoint/2010/main" val="32872434"/>
+      </p:ext>
+    </p:extLst>
+  </p:cSld>
+  <p:clrMapOvr>
+    <a:masterClrMapping/>
+  </p:clrMapOvr>
+</p:sld>
+</file>
+
+<file path=ppt/slides/slide3.xml><?xml version="1.0" encoding="utf-8"?>
+<p:sld xmlns:a="http://schemas.openxmlformats.org/drawingml/2006/main" xmlns:r="http://schemas.openxmlformats.org/officeDocument/2006/relationships" xmlns:p="http://schemas.openxmlformats.org/presentationml/2006/main">
+  <p:cSld>
+    <p:spTree>
+      <p:nvGrpSpPr>
+        <p:cNvPr id="1" name=""/>
+        <p:cNvGrpSpPr/>
+        <p:nvPr/>
+      </p:nvGrpSpPr>
+      <p:grpSpPr>
+        <a:xfrm>
+          <a:off x="0" y="0"/>
+          <a:ext cx="0" cy="0"/>
+          <a:chOff x="0" y="0"/>
+          <a:chExt cx="0" cy="0"/>
+        </a:xfrm>
+      </p:grpSpPr>
+      <p:sp>
+        <p:nvSpPr>
+          <p:cNvPr id="2" name="Title 1">
+            <a:extLst>
+              <a:ext uri="{FF2B5EF4-FFF2-40B4-BE49-F238E27FC236}">
+                <a16:creationId xmlns:a16="http://schemas.microsoft.com/office/drawing/2014/main" id="{F56EFC4B-8ACF-834D-BFD8-D4D3EE73DA13}"/>
+              </a:ext>
+            </a:extLst>
+          </p:cNvPr>
+          <p:cNvSpPr>
+            <a:spLocks noGrp="1"/>
+          </p:cNvSpPr>
+          <p:nvPr>
+            <p:ph type="title"/>
+          </p:nvPr>
+        </p:nvSpPr>
+        <p:spPr/>
+        <p:txBody>
+          <a:bodyPr/>
+          <a:lstStyle/>
+          <a:p>
+            <a:r>
+              <a:rPr lang="en-US" dirty="0"/>
+              <a:t>What is the ASVS?</a:t>
+            </a:r>
+          </a:p>
+        </p:txBody>
+      </p:sp>
+      <p:sp>
+        <p:nvSpPr>
+          <p:cNvPr id="3" name="Content Placeholder 2">
+            <a:extLst>
+              <a:ext uri="{FF2B5EF4-FFF2-40B4-BE49-F238E27FC236}">
+                <a16:creationId xmlns:a16="http://schemas.microsoft.com/office/drawing/2014/main" id="{7463E998-4507-504D-88F1-2DCAD4A1482F}"/>
+              </a:ext>
+            </a:extLst>
+          </p:cNvPr>
+          <p:cNvSpPr>
+            <a:spLocks noGrp="1"/>
+          </p:cNvSpPr>
+          <p:nvPr>
+            <p:ph idx="1"/>
+          </p:nvPr>
+        </p:nvSpPr>
+        <p:spPr/>
+        <p:txBody>
+          <a:bodyPr/>
+          <a:lstStyle/>
+          <a:p>
+            <a:r>
+              <a:rPr lang="en-US" dirty="0"/>
+              <a:t>Started as 80/20 checklist</a:t>
+            </a:r>
+          </a:p>
+          <a:p>
+            <a:r>
+              <a:rPr lang="en-US" dirty="0"/>
+              <a:t>Designed to be an actual application security standard</a:t>
+            </a:r>
+          </a:p>
+          <a:p>
+            <a:r>
+              <a:rPr lang="en-US" dirty="0"/>
+              <a:t>Set of leading practices – even 2.0 was challenging for many </a:t>
+            </a:r>
+          </a:p>
+          <a:p>
+            <a:r>
+              <a:rPr lang="en-US" dirty="0"/>
+              <a:t>Community and Industry Driven</a:t>
+            </a:r>
+          </a:p>
+          <a:p>
+            <a:endParaRPr lang="en-US" dirty="0"/>
+          </a:p>
+          <a:p>
+            <a:r>
+              <a:rPr lang="en-US" dirty="0"/>
+              <a:t>Completely developed in the open at GitHub</a:t>
+            </a:r>
+          </a:p>
+          <a:p>
+            <a:pPr lvl="1"/>
+            <a:r>
+              <a:rPr lang="en-US" dirty="0"/>
+              <a:t>Submit issues! Submit PRs! Translate please!</a:t>
+            </a:r>
+          </a:p>
+        </p:txBody>
+      </p:sp>
+    </p:spTree>
+    <p:extLst>
+      <p:ext uri="{BB962C8B-B14F-4D97-AF65-F5344CB8AC3E}">
+        <p14:creationId xmlns:p14="http://schemas.microsoft.com/office/powerpoint/2010/main" val="2853629961"/>
+      </p:ext>
+    </p:extLst>
+  </p:cSld>
+  <p:clrMapOvr>
+    <a:masterClrMapping/>
+  </p:clrMapOvr>
+</p:sld>
+</file>
+
+<file path=ppt/slides/slide30.xml><?xml version="1.0" encoding="utf-8"?>
 <p:sld xmlns:a="http://schemas.openxmlformats.org/drawingml/2006/main" xmlns:r="http://schemas.openxmlformats.org/officeDocument/2006/relationships" xmlns:p="http://schemas.openxmlformats.org/presentationml/2006/main">
   <p:cSld>
     <p:spTree>
@@ -7636,7 +8161,7 @@
 </p:sld>
 </file>
 
-<file path=ppt/slides/slide27.xml><?xml version="1.0" encoding="utf-8"?>
+<file path=ppt/slides/slide31.xml><?xml version="1.0" encoding="utf-8"?>
 <p:sld xmlns:a="http://schemas.openxmlformats.org/drawingml/2006/main" xmlns:r="http://schemas.openxmlformats.org/officeDocument/2006/relationships" xmlns:p="http://schemas.openxmlformats.org/presentationml/2006/main">
   <p:cSld>
     <p:spTree>
@@ -7752,7 +8277,7 @@
 </p:sld>
 </file>
 
-<file path=ppt/slides/slide28.xml><?xml version="1.0" encoding="utf-8"?>
+<file path=ppt/slides/slide32.xml><?xml version="1.0" encoding="utf-8"?>
 <p:sld xmlns:a="http://schemas.openxmlformats.org/drawingml/2006/main" xmlns:r="http://schemas.openxmlformats.org/officeDocument/2006/relationships" xmlns:p="http://schemas.openxmlformats.org/presentationml/2006/main">
   <p:cSld>
     <p:spTree>
@@ -7876,7 +8401,7 @@
 </p:sld>
 </file>
 
-<file path=ppt/slides/slide29.xml><?xml version="1.0" encoding="utf-8"?>
+<file path=ppt/slides/slide33.xml><?xml version="1.0" encoding="utf-8"?>
 <p:sld xmlns:a="http://schemas.openxmlformats.org/drawingml/2006/main" xmlns:r="http://schemas.openxmlformats.org/officeDocument/2006/relationships" xmlns:p="http://schemas.openxmlformats.org/presentationml/2006/main">
   <p:cSld>
     <p:spTree>
@@ -7895,10 +8420,10 @@
       </p:grpSpPr>
       <p:sp>
         <p:nvSpPr>
-          <p:cNvPr id="3" name="Title 2">
-            <a:extLst>
-              <a:ext uri="{FF2B5EF4-FFF2-40B4-BE49-F238E27FC236}">
-                <a16:creationId xmlns:a16="http://schemas.microsoft.com/office/drawing/2014/main" id="{70904BCF-B17A-4F07-A3AC-C19F7819EB32}"/>
+          <p:cNvPr id="2" name="Title 1">
+            <a:extLst>
+              <a:ext uri="{FF2B5EF4-FFF2-40B4-BE49-F238E27FC236}">
+                <a16:creationId xmlns:a16="http://schemas.microsoft.com/office/drawing/2014/main" id="{636CEFAB-D61E-4F0E-B55C-B11DE4E57E92}"/>
               </a:ext>
             </a:extLst>
           </p:cNvPr>
@@ -7916,73 +8441,76 @@
           <a:p>
             <a:r>
               <a:rPr lang="en-US" dirty="0"/>
-              <a:t>Thank you</a:t>
-            </a:r>
-          </a:p>
-        </p:txBody>
-      </p:sp>
-      <p:sp>
-        <p:nvSpPr>
-          <p:cNvPr id="4" name="Text Placeholder 3">
-            <a:extLst>
-              <a:ext uri="{FF2B5EF4-FFF2-40B4-BE49-F238E27FC236}">
-                <a16:creationId xmlns:a16="http://schemas.microsoft.com/office/drawing/2014/main" id="{907EC897-72B7-4338-BB2E-E9511C1A96AF}"/>
-              </a:ext>
-            </a:extLst>
-          </p:cNvPr>
-          <p:cNvSpPr>
-            <a:spLocks noGrp="1"/>
-          </p:cNvSpPr>
-          <p:nvPr>
-            <p:ph type="body" idx="1"/>
-          </p:nvPr>
-        </p:nvSpPr>
-        <p:spPr/>
-        <p:txBody>
-          <a:bodyPr/>
-          <a:lstStyle/>
-          <a:p>
-            <a:r>
-              <a:rPr lang="en-US" dirty="0">
-                <a:hlinkClick r:id="rId2"/>
-              </a:rPr>
-              <a:t>vanderaj@owasp.org</a:t>
-            </a:r>
-            <a:r>
-              <a:rPr lang="en-US" dirty="0"/>
-              <a:t> (ASVS) | </a:t>
-            </a:r>
-            <a:r>
-              <a:rPr lang="en-US" dirty="0">
-                <a:hlinkClick r:id="rId3"/>
-              </a:rPr>
-              <a:t>vander@synopsys.com</a:t>
-            </a:r>
-            <a:r>
-              <a:rPr lang="en-US" dirty="0"/>
-              <a:t> ($</a:t>
-            </a:r>
-            <a:r>
-              <a:rPr lang="en-US" dirty="0" err="1"/>
-              <a:t>dayjob</a:t>
-            </a:r>
-            <a:r>
-              <a:rPr lang="en-US" dirty="0"/>
-              <a:t>)</a:t>
-            </a:r>
-          </a:p>
-          <a:p>
-            <a:r>
-              <a:rPr lang="en-US" dirty="0"/>
-              <a:t>@vanderaj </a:t>
-            </a:r>
+              <a:t>When can I get it?</a:t>
+            </a:r>
+          </a:p>
+        </p:txBody>
+      </p:sp>
+      <p:sp>
+        <p:nvSpPr>
+          <p:cNvPr id="3" name="Content Placeholder 2">
+            <a:extLst>
+              <a:ext uri="{FF2B5EF4-FFF2-40B4-BE49-F238E27FC236}">
+                <a16:creationId xmlns:a16="http://schemas.microsoft.com/office/drawing/2014/main" id="{AAB61F75-05F8-4872-86BB-9C8368D38246}"/>
+              </a:ext>
+            </a:extLst>
+          </p:cNvPr>
+          <p:cNvSpPr>
+            <a:spLocks noGrp="1"/>
+          </p:cNvSpPr>
+          <p:nvPr>
+            <p:ph idx="1"/>
+          </p:nvPr>
+        </p:nvSpPr>
+        <p:spPr/>
+        <p:txBody>
+          <a:bodyPr/>
+          <a:lstStyle/>
+          <a:p>
+            <a:r>
+              <a:rPr lang="en-US" dirty="0"/>
+              <a:t>The ASVS 4.0 Final is available now! </a:t>
+            </a:r>
+          </a:p>
+          <a:p>
+            <a:endParaRPr lang="en-US" dirty="0"/>
+          </a:p>
+          <a:p>
+            <a:r>
+              <a:rPr lang="en-US" dirty="0"/>
+              <a:t>OWASP Wiki – Word, PDFs, CSVs, and Hot Linkable markdown</a:t>
+            </a:r>
+          </a:p>
+          <a:p>
+            <a:r>
+              <a:rPr lang="en-US" dirty="0"/>
+              <a:t>GitHub - Final Version is in the 4.0 branch</a:t>
+            </a:r>
+          </a:p>
+          <a:p>
+            <a:r>
+              <a:rPr lang="en-US" dirty="0"/>
+              <a:t>GitHub – Development Version is in the master branch</a:t>
+            </a:r>
+          </a:p>
+          <a:p>
+            <a:endParaRPr lang="en-US" dirty="0"/>
+          </a:p>
+          <a:p>
+            <a:r>
+              <a:rPr lang="en-US" dirty="0"/>
+              <a:t>You can also get this presentation so you can give this to your local chapter, school, college, or workplace!</a:t>
+            </a:r>
+          </a:p>
+          <a:p>
+            <a:endParaRPr lang="en-US" dirty="0"/>
           </a:p>
         </p:txBody>
       </p:sp>
     </p:spTree>
     <p:extLst>
       <p:ext uri="{BB962C8B-B14F-4D97-AF65-F5344CB8AC3E}">
-        <p14:creationId xmlns:p14="http://schemas.microsoft.com/office/powerpoint/2010/main" val="2415180917"/>
+        <p14:creationId xmlns:p14="http://schemas.microsoft.com/office/powerpoint/2010/main" val="1840743557"/>
       </p:ext>
     </p:extLst>
   </p:cSld>
@@ -7992,7 +8520,7 @@
 </p:sld>
 </file>
 
-<file path=ppt/slides/slide3.xml><?xml version="1.0" encoding="utf-8"?>
+<file path=ppt/slides/slide34.xml><?xml version="1.0" encoding="utf-8"?>
 <p:sld xmlns:a="http://schemas.openxmlformats.org/drawingml/2006/main" xmlns:r="http://schemas.openxmlformats.org/officeDocument/2006/relationships" xmlns:p="http://schemas.openxmlformats.org/presentationml/2006/main">
   <p:cSld>
     <p:spTree>
@@ -8011,10 +8539,10 @@
       </p:grpSpPr>
       <p:sp>
         <p:nvSpPr>
-          <p:cNvPr id="2" name="Title 1">
-            <a:extLst>
-              <a:ext uri="{FF2B5EF4-FFF2-40B4-BE49-F238E27FC236}">
-                <a16:creationId xmlns:a16="http://schemas.microsoft.com/office/drawing/2014/main" id="{F56EFC4B-8ACF-834D-BFD8-D4D3EE73DA13}"/>
+          <p:cNvPr id="3" name="Title 2">
+            <a:extLst>
+              <a:ext uri="{FF2B5EF4-FFF2-40B4-BE49-F238E27FC236}">
+                <a16:creationId xmlns:a16="http://schemas.microsoft.com/office/drawing/2014/main" id="{70904BCF-B17A-4F07-A3AC-C19F7819EB32}"/>
               </a:ext>
             </a:extLst>
           </p:cNvPr>
@@ -8032,69 +8560,65 @@
           <a:p>
             <a:r>
               <a:rPr lang="en-US" dirty="0"/>
-              <a:t>What is the ASVS?</a:t>
-            </a:r>
-          </a:p>
-        </p:txBody>
-      </p:sp>
-      <p:sp>
-        <p:nvSpPr>
-          <p:cNvPr id="3" name="Content Placeholder 2">
-            <a:extLst>
-              <a:ext uri="{FF2B5EF4-FFF2-40B4-BE49-F238E27FC236}">
-                <a16:creationId xmlns:a16="http://schemas.microsoft.com/office/drawing/2014/main" id="{7463E998-4507-504D-88F1-2DCAD4A1482F}"/>
-              </a:ext>
-            </a:extLst>
-          </p:cNvPr>
-          <p:cNvSpPr>
-            <a:spLocks noGrp="1"/>
-          </p:cNvSpPr>
-          <p:nvPr>
-            <p:ph idx="1"/>
-          </p:nvPr>
-        </p:nvSpPr>
-        <p:spPr/>
-        <p:txBody>
-          <a:bodyPr/>
-          <a:lstStyle/>
-          <a:p>
-            <a:r>
-              <a:rPr lang="en-US" dirty="0"/>
-              <a:t>Started as 80/20 checklist</a:t>
-            </a:r>
-          </a:p>
-          <a:p>
-            <a:r>
-              <a:rPr lang="en-US" dirty="0"/>
-              <a:t>Designed to be an actual application security standard</a:t>
-            </a:r>
-          </a:p>
-          <a:p>
-            <a:r>
-              <a:rPr lang="en-US" dirty="0"/>
-              <a:t>Set of leading practices – even 2.0 was challenging for many </a:t>
-            </a:r>
-          </a:p>
-          <a:p>
-            <a:r>
-              <a:rPr lang="en-US" dirty="0"/>
-              <a:t>Community and Industry Driven</a:t>
-            </a:r>
-          </a:p>
-          <a:p>
-            <a:endParaRPr lang="en-US" dirty="0"/>
-          </a:p>
-          <a:p>
-            <a:r>
-              <a:rPr lang="en-US" dirty="0"/>
-              <a:t>Completely developed in the open at GitHub</a:t>
-            </a:r>
-          </a:p>
-          <a:p>
-            <a:pPr lvl="1"/>
-            <a:r>
-              <a:rPr lang="en-US" dirty="0"/>
-              <a:t>Submit issues! Submit PRs! Translate please!</a:t>
+              <a:t>Thank you</a:t>
+            </a:r>
+          </a:p>
+        </p:txBody>
+      </p:sp>
+      <p:sp>
+        <p:nvSpPr>
+          <p:cNvPr id="4" name="Text Placeholder 3">
+            <a:extLst>
+              <a:ext uri="{FF2B5EF4-FFF2-40B4-BE49-F238E27FC236}">
+                <a16:creationId xmlns:a16="http://schemas.microsoft.com/office/drawing/2014/main" id="{907EC897-72B7-4338-BB2E-E9511C1A96AF}"/>
+              </a:ext>
+            </a:extLst>
+          </p:cNvPr>
+          <p:cNvSpPr>
+            <a:spLocks noGrp="1"/>
+          </p:cNvSpPr>
+          <p:nvPr>
+            <p:ph type="body" idx="1"/>
+          </p:nvPr>
+        </p:nvSpPr>
+        <p:spPr/>
+        <p:txBody>
+          <a:bodyPr/>
+          <a:lstStyle/>
+          <a:p>
+            <a:r>
+              <a:rPr lang="en-US" dirty="0">
+                <a:hlinkClick r:id="rId2"/>
+              </a:rPr>
+              <a:t>vanderaj@owasp.org</a:t>
+            </a:r>
+            <a:r>
+              <a:rPr lang="en-US" dirty="0"/>
+              <a:t> (ASVS) | </a:t>
+            </a:r>
+            <a:r>
+              <a:rPr lang="en-US" dirty="0">
+                <a:hlinkClick r:id="rId3"/>
+              </a:rPr>
+              <a:t>vander@synopsys.com</a:t>
+            </a:r>
+            <a:r>
+              <a:rPr lang="en-US" dirty="0"/>
+              <a:t> ($</a:t>
+            </a:r>
+            <a:r>
+              <a:rPr lang="en-US" dirty="0" err="1"/>
+              <a:t>dayjob</a:t>
+            </a:r>
+            <a:r>
+              <a:rPr lang="en-US" dirty="0"/>
+              <a:t>)</a:t>
+            </a:r>
+          </a:p>
+          <a:p>
+            <a:r>
+              <a:rPr lang="en-US" dirty="0"/>
+              <a:t>@vanderaj </a:t>
             </a:r>
           </a:p>
         </p:txBody>
@@ -8102,7 +8626,7 @@
     </p:spTree>
     <p:extLst>
       <p:ext uri="{BB962C8B-B14F-4D97-AF65-F5344CB8AC3E}">
-        <p14:creationId xmlns:p14="http://schemas.microsoft.com/office/powerpoint/2010/main" val="2853629961"/>
+        <p14:creationId xmlns:p14="http://schemas.microsoft.com/office/powerpoint/2010/main" val="2415180917"/>
       </p:ext>
     </p:extLst>
   </p:cSld>
@@ -8545,19 +9069,6 @@
             <a:r>
               <a:rPr lang="en-US" dirty="0"/>
               <a:t>NIST 800-63 compliance</a:t>
-            </a:r>
-          </a:p>
-          <a:p>
-            <a:r>
-              <a:rPr lang="en-US" dirty="0"/>
-              <a:t>Data Protection has been upped to be primarily about human sensitive personal identifying information</a:t>
-            </a:r>
-          </a:p>
-          <a:p>
-            <a:pPr lvl="1"/>
-            <a:r>
-              <a:rPr lang="en-US" dirty="0"/>
-              <a:t>Helps with GDPR and APPs</a:t>
             </a:r>
           </a:p>
           <a:p>

</xml_diff>